<commit_message>
material for the liste and tuples (on-going)
</commit_message>
<xml_diff>
--- a/semaine2/CO12AL-W2-SLIDE3.pptx
+++ b/semaine2/CO12AL-W2-SLIDE3.pptx
@@ -4669,21 +4669,7 @@
                 <a:latin typeface="Courier New" panose="02070309020205020404" pitchFamily="49" charset="0"/>
                 <a:cs typeface="Courier New" panose="02070309020205020404" pitchFamily="49" charset="0"/>
               </a:rPr>
-              <a:t>  </a:t>
-            </a:r>
-            <a:r>
-              <a:rPr lang="fr-FR" dirty="0" smtClean="0">
-                <a:latin typeface="Courier New" panose="02070309020205020404" pitchFamily="49" charset="0"/>
-                <a:cs typeface="Courier New" panose="02070309020205020404" pitchFamily="49" charset="0"/>
-              </a:rPr>
-              <a:t> </a:t>
-            </a:r>
-            <a:r>
-              <a:rPr lang="fr-FR" dirty="0" smtClean="0">
-                <a:latin typeface="Courier New" panose="02070309020205020404" pitchFamily="49" charset="0"/>
-                <a:cs typeface="Courier New" panose="02070309020205020404" pitchFamily="49" charset="0"/>
-              </a:rPr>
-              <a:t>s </a:t>
+              <a:t>   s </a:t>
             </a:r>
             <a:r>
               <a:rPr lang="fr-FR" dirty="0">
@@ -4724,21 +4710,41 @@
                 <a:latin typeface="Courier New" panose="02070309020205020404" pitchFamily="49" charset="0"/>
                 <a:cs typeface="Courier New" panose="02070309020205020404" pitchFamily="49" charset="0"/>
               </a:rPr>
-              <a:t>  </a:t>
+              <a:t>   s[</a:t>
             </a:r>
             <a:r>
               <a:rPr lang="fr-FR" dirty="0" smtClean="0">
+                <a:solidFill>
+                  <a:srgbClr val="00B050"/>
+                </a:solidFill>
                 <a:latin typeface="Courier New" panose="02070309020205020404" pitchFamily="49" charset="0"/>
                 <a:cs typeface="Courier New" panose="02070309020205020404" pitchFamily="49" charset="0"/>
               </a:rPr>
-              <a:t> </a:t>
+              <a:t>0</a:t>
             </a:r>
             <a:r>
               <a:rPr lang="fr-FR" dirty="0" smtClean="0">
                 <a:latin typeface="Courier New" panose="02070309020205020404" pitchFamily="49" charset="0"/>
                 <a:cs typeface="Courier New" panose="02070309020205020404" pitchFamily="49" charset="0"/>
               </a:rPr>
-              <a:t>s[0:3]</a:t>
+              <a:t>:</a:t>
+            </a:r>
+            <a:r>
+              <a:rPr lang="fr-FR" dirty="0" smtClean="0">
+                <a:solidFill>
+                  <a:schemeClr val="accent2"/>
+                </a:solidFill>
+                <a:latin typeface="Courier New" panose="02070309020205020404" pitchFamily="49" charset="0"/>
+                <a:cs typeface="Courier New" panose="02070309020205020404" pitchFamily="49" charset="0"/>
+              </a:rPr>
+              <a:t>3</a:t>
+            </a:r>
+            <a:r>
+              <a:rPr lang="fr-FR" dirty="0" smtClean="0">
+                <a:latin typeface="Courier New" panose="02070309020205020404" pitchFamily="49" charset="0"/>
+                <a:cs typeface="Courier New" panose="02070309020205020404" pitchFamily="49" charset="0"/>
+              </a:rPr>
+              <a:t>]</a:t>
             </a:r>
           </a:p>
           <a:p>
@@ -4781,21 +4787,7 @@
                 <a:latin typeface="Courier New" panose="02070309020205020404" pitchFamily="49" charset="0"/>
                 <a:cs typeface="Courier New" panose="02070309020205020404" pitchFamily="49" charset="0"/>
               </a:rPr>
-              <a:t>  </a:t>
-            </a:r>
-            <a:r>
-              <a:rPr lang="fr-FR" dirty="0" smtClean="0">
-                <a:latin typeface="Courier New" panose="02070309020205020404" pitchFamily="49" charset="0"/>
-                <a:cs typeface="Courier New" panose="02070309020205020404" pitchFamily="49" charset="0"/>
-              </a:rPr>
-              <a:t> </a:t>
-            </a:r>
-            <a:r>
-              <a:rPr lang="fr-FR" dirty="0" smtClean="0">
-                <a:latin typeface="Courier New" panose="02070309020205020404" pitchFamily="49" charset="0"/>
-                <a:cs typeface="Courier New" panose="02070309020205020404" pitchFamily="49" charset="0"/>
-              </a:rPr>
-              <a:t>s[5:10]</a:t>
+              <a:t>   s[5:10]</a:t>
             </a:r>
           </a:p>
           <a:p>
@@ -4817,14 +4809,7 @@
                 <a:latin typeface="Courier New" panose="02070309020205020404" pitchFamily="49" charset="0"/>
                 <a:cs typeface="Courier New" panose="02070309020205020404" pitchFamily="49" charset="0"/>
               </a:rPr>
-              <a:t>    s</a:t>
-            </a:r>
-            <a:r>
-              <a:rPr lang="fr-FR" dirty="0" smtClean="0">
-                <a:latin typeface="Courier New" panose="02070309020205020404" pitchFamily="49" charset="0"/>
-                <a:cs typeface="Courier New" panose="02070309020205020404" pitchFamily="49" charset="0"/>
-              </a:rPr>
-              <a:t>[:3]</a:t>
+              <a:t>    s[:3]</a:t>
             </a:r>
           </a:p>
           <a:p>
@@ -4863,10 +4848,28 @@
                 <a:latin typeface="Courier New" panose="02070309020205020404" pitchFamily="49" charset="0"/>
                 <a:cs typeface="Courier New" panose="02070309020205020404" pitchFamily="49" charset="0"/>
               </a:rPr>
-              <a:t>  </a:t>
+              <a:t>   s[5:]</a:t>
+            </a:r>
+          </a:p>
+          <a:p>
+            <a:r>
+              <a:rPr lang="fr-FR" dirty="0">
+                <a:latin typeface="Courier New" panose="02070309020205020404" pitchFamily="49" charset="0"/>
+                <a:cs typeface="Courier New" panose="02070309020205020404" pitchFamily="49" charset="0"/>
+              </a:rPr>
+              <a:t>'bacon</a:t>
             </a:r>
             <a:r>
               <a:rPr lang="fr-FR" dirty="0" smtClean="0">
+                <a:latin typeface="Courier New" panose="02070309020205020404" pitchFamily="49" charset="0"/>
+                <a:cs typeface="Courier New" panose="02070309020205020404" pitchFamily="49" charset="0"/>
+              </a:rPr>
+              <a:t>'</a:t>
+            </a:r>
+          </a:p>
+          <a:p>
+            <a:r>
+              <a:rPr lang="fr-FR" dirty="0">
                 <a:latin typeface="Courier New" panose="02070309020205020404" pitchFamily="49" charset="0"/>
                 <a:cs typeface="Courier New" panose="02070309020205020404" pitchFamily="49" charset="0"/>
               </a:rPr>
@@ -4877,53 +4880,7 @@
                 <a:latin typeface="Courier New" panose="02070309020205020404" pitchFamily="49" charset="0"/>
                 <a:cs typeface="Courier New" panose="02070309020205020404" pitchFamily="49" charset="0"/>
               </a:rPr>
-              <a:t>s[5:]</a:t>
-            </a:r>
-          </a:p>
-          <a:p>
-            <a:r>
-              <a:rPr lang="fr-FR" dirty="0">
-                <a:latin typeface="Courier New" panose="02070309020205020404" pitchFamily="49" charset="0"/>
-                <a:cs typeface="Courier New" panose="02070309020205020404" pitchFamily="49" charset="0"/>
-              </a:rPr>
-              <a:t>'bacon</a:t>
-            </a:r>
-            <a:r>
-              <a:rPr lang="fr-FR" dirty="0" smtClean="0">
-                <a:latin typeface="Courier New" panose="02070309020205020404" pitchFamily="49" charset="0"/>
-                <a:cs typeface="Courier New" panose="02070309020205020404" pitchFamily="49" charset="0"/>
-              </a:rPr>
-              <a:t>'</a:t>
-            </a:r>
-          </a:p>
-          <a:p>
-            <a:r>
-              <a:rPr lang="fr-FR" dirty="0">
-                <a:latin typeface="Courier New" panose="02070309020205020404" pitchFamily="49" charset="0"/>
-                <a:cs typeface="Courier New" panose="02070309020205020404" pitchFamily="49" charset="0"/>
-              </a:rPr>
-              <a:t> </a:t>
-            </a:r>
-            <a:r>
-              <a:rPr lang="fr-FR" dirty="0" smtClean="0">
-                <a:latin typeface="Courier New" panose="02070309020205020404" pitchFamily="49" charset="0"/>
-                <a:cs typeface="Courier New" panose="02070309020205020404" pitchFamily="49" charset="0"/>
-              </a:rPr>
-              <a:t>  </a:t>
-            </a:r>
-            <a:r>
-              <a:rPr lang="fr-FR" dirty="0" smtClean="0">
-                <a:latin typeface="Courier New" panose="02070309020205020404" pitchFamily="49" charset="0"/>
-                <a:cs typeface="Courier New" panose="02070309020205020404" pitchFamily="49" charset="0"/>
-              </a:rPr>
-              <a:t> </a:t>
-            </a:r>
-            <a:r>
-              <a:rPr lang="fr-FR" dirty="0" smtClean="0">
-                <a:latin typeface="Courier New" panose="02070309020205020404" pitchFamily="49" charset="0"/>
-                <a:cs typeface="Courier New" panose="02070309020205020404" pitchFamily="49" charset="0"/>
-              </a:rPr>
-              <a:t>s[:]</a:t>
+              <a:t>   s[:]</a:t>
             </a:r>
           </a:p>
           <a:p>
@@ -5163,27 +5120,7 @@
                   <a:latin typeface="Courier New" panose="02070309020205020404" pitchFamily="49" charset="0"/>
                   <a:cs typeface="Courier New" panose="02070309020205020404" pitchFamily="49" charset="0"/>
                 </a:rPr>
-                <a:t> 0   1   2   3   4   5   6   7   8   </a:t>
-              </a:r>
-              <a:r>
-                <a:rPr lang="fr-FR" dirty="0" smtClean="0">
-                  <a:solidFill>
-                    <a:srgbClr val="FF0000"/>
-                  </a:solidFill>
-                  <a:latin typeface="Courier New" panose="02070309020205020404" pitchFamily="49" charset="0"/>
-                  <a:cs typeface="Courier New" panose="02070309020205020404" pitchFamily="49" charset="0"/>
-                </a:rPr>
-                <a:t>9        </a:t>
-              </a:r>
-              <a:r>
-                <a:rPr lang="fr-FR" dirty="0" smtClean="0">
-                  <a:solidFill>
-                    <a:srgbClr val="FF0000"/>
-                  </a:solidFill>
-                  <a:latin typeface="Courier New" panose="02070309020205020404" pitchFamily="49" charset="0"/>
-                  <a:cs typeface="Courier New" panose="02070309020205020404" pitchFamily="49" charset="0"/>
-                </a:rPr>
-                <a:t>   </a:t>
+                <a:t> 0   1   2   3   4   5   6   7   8   9           </a:t>
               </a:r>
               <a:endParaRPr lang="fr-FR" dirty="0">
                 <a:solidFill>
@@ -7020,31 +6957,80 @@
                 <a:latin typeface="Courier New" panose="02070309020205020404" pitchFamily="49" charset="0"/>
                 <a:cs typeface="Courier New" panose="02070309020205020404" pitchFamily="49" charset="0"/>
               </a:rPr>
-              <a:t>  </a:t>
+              <a:t>   s[0:10:</a:t>
             </a:r>
             <a:r>
               <a:rPr lang="fr-FR" dirty="0" smtClean="0">
+                <a:solidFill>
+                  <a:srgbClr val="00B050"/>
+                </a:solidFill>
+                <a:latin typeface="Courier New" panose="02070309020205020404" pitchFamily="49" charset="0"/>
+                <a:cs typeface="Courier New" panose="02070309020205020404" pitchFamily="49" charset="0"/>
+              </a:rPr>
+              <a:t>2</a:t>
+            </a:r>
+            <a:r>
+              <a:rPr lang="fr-FR" dirty="0" smtClean="0">
+                <a:latin typeface="Courier New" panose="02070309020205020404" pitchFamily="49" charset="0"/>
+                <a:cs typeface="Courier New" panose="02070309020205020404" pitchFamily="49" charset="0"/>
+              </a:rPr>
+              <a:t>]</a:t>
+            </a:r>
+          </a:p>
+          <a:p>
+            <a:r>
+              <a:rPr lang="fr-FR" dirty="0">
+                <a:latin typeface="Courier New" panose="02070309020205020404" pitchFamily="49" charset="0"/>
+                <a:cs typeface="Courier New" panose="02070309020205020404" pitchFamily="49" charset="0"/>
+              </a:rPr>
+              <a:t>'</a:t>
+            </a:r>
+            <a:r>
+              <a:rPr lang="fr-FR" dirty="0" err="1">
+                <a:latin typeface="Courier New" panose="02070309020205020404" pitchFamily="49" charset="0"/>
+                <a:cs typeface="Courier New" panose="02070309020205020404" pitchFamily="49" charset="0"/>
+              </a:rPr>
+              <a:t>eg</a:t>
+            </a:r>
+            <a:r>
+              <a:rPr lang="fr-FR" dirty="0">
                 <a:latin typeface="Courier New" panose="02070309020205020404" pitchFamily="49" charset="0"/>
                 <a:cs typeface="Courier New" panose="02070309020205020404" pitchFamily="49" charset="0"/>
               </a:rPr>
               <a:t> </a:t>
             </a:r>
             <a:r>
+              <a:rPr lang="fr-FR" dirty="0" err="1" smtClean="0">
+                <a:latin typeface="Courier New" panose="02070309020205020404" pitchFamily="49" charset="0"/>
+                <a:cs typeface="Courier New" panose="02070309020205020404" pitchFamily="49" charset="0"/>
+              </a:rPr>
+              <a:t>ao</a:t>
+            </a:r>
+            <a:r>
               <a:rPr lang="fr-FR" dirty="0" smtClean="0">
-                <a:latin typeface="Courier New" panose="02070309020205020404" pitchFamily="49" charset="0"/>
-                <a:cs typeface="Courier New" panose="02070309020205020404" pitchFamily="49" charset="0"/>
-              </a:rPr>
-              <a:t>s[0:10:2]</a:t>
-            </a:r>
-          </a:p>
-          <a:p>
-            <a:r>
-              <a:rPr lang="fr-FR" dirty="0">
                 <a:latin typeface="Courier New" panose="02070309020205020404" pitchFamily="49" charset="0"/>
                 <a:cs typeface="Courier New" panose="02070309020205020404" pitchFamily="49" charset="0"/>
               </a:rPr>
               <a:t>'</a:t>
             </a:r>
+          </a:p>
+          <a:p>
+            <a:r>
+              <a:rPr lang="fr-FR" dirty="0" smtClean="0">
+                <a:latin typeface="Courier New" panose="02070309020205020404" pitchFamily="49" charset="0"/>
+                <a:cs typeface="Courier New" panose="02070309020205020404" pitchFamily="49" charset="0"/>
+              </a:rPr>
+              <a:t>    s[::2]</a:t>
+            </a:r>
+          </a:p>
+          <a:p>
+            <a:r>
+              <a:rPr lang="fr-FR" dirty="0">
+                <a:latin typeface="Courier New" panose="02070309020205020404" pitchFamily="49" charset="0"/>
+                <a:cs typeface="Courier New" panose="02070309020205020404" pitchFamily="49" charset="0"/>
+              </a:rPr>
+              <a:t>'</a:t>
+            </a:r>
             <a:r>
               <a:rPr lang="fr-FR" dirty="0" err="1">
                 <a:latin typeface="Courier New" panose="02070309020205020404" pitchFamily="49" charset="0"/>
@@ -7060,14 +7046,14 @@
               <a:t> </a:t>
             </a:r>
             <a:r>
-              <a:rPr lang="fr-FR" dirty="0" err="1" smtClean="0">
+              <a:rPr lang="fr-FR" dirty="0" err="1">
                 <a:latin typeface="Courier New" panose="02070309020205020404" pitchFamily="49" charset="0"/>
                 <a:cs typeface="Courier New" panose="02070309020205020404" pitchFamily="49" charset="0"/>
               </a:rPr>
               <a:t>ao</a:t>
             </a:r>
             <a:r>
-              <a:rPr lang="fr-FR" dirty="0" smtClean="0">
+              <a:rPr lang="fr-FR" dirty="0">
                 <a:latin typeface="Courier New" panose="02070309020205020404" pitchFamily="49" charset="0"/>
                 <a:cs typeface="Courier New" panose="02070309020205020404" pitchFamily="49" charset="0"/>
               </a:rPr>
@@ -7076,35 +7062,44 @@
           </a:p>
           <a:p>
             <a:r>
+              <a:rPr lang="fr-FR" dirty="0">
+                <a:latin typeface="Courier New" panose="02070309020205020404" pitchFamily="49" charset="0"/>
+                <a:cs typeface="Courier New" panose="02070309020205020404" pitchFamily="49" charset="0"/>
+              </a:rPr>
+              <a:t> </a:t>
+            </a:r>
+            <a:r>
               <a:rPr lang="fr-FR" dirty="0" smtClean="0">
                 <a:latin typeface="Courier New" panose="02070309020205020404" pitchFamily="49" charset="0"/>
                 <a:cs typeface="Courier New" panose="02070309020205020404" pitchFamily="49" charset="0"/>
               </a:rPr>
-              <a:t>    s</a:t>
-            </a:r>
+              <a:t>   s[:8:3]</a:t>
+            </a:r>
+          </a:p>
+          <a:p>
             <a:r>
               <a:rPr lang="fr-FR" dirty="0" smtClean="0">
-                <a:latin typeface="Courier New" panose="02070309020205020404" pitchFamily="49" charset="0"/>
-                <a:cs typeface="Courier New" panose="02070309020205020404" pitchFamily="49" charset="0"/>
-              </a:rPr>
-              <a:t>[::2]</a:t>
-            </a:r>
-          </a:p>
-          <a:p>
-            <a:r>
-              <a:rPr lang="fr-FR" dirty="0">
                 <a:latin typeface="Courier New" panose="02070309020205020404" pitchFamily="49" charset="0"/>
                 <a:cs typeface="Courier New" panose="02070309020205020404" pitchFamily="49" charset="0"/>
               </a:rPr>
               <a:t>'</a:t>
             </a:r>
             <a:r>
-              <a:rPr lang="fr-FR" dirty="0" err="1">
+              <a:rPr lang="fr-FR" dirty="0" err="1" smtClean="0">
                 <a:latin typeface="Courier New" panose="02070309020205020404" pitchFamily="49" charset="0"/>
                 <a:cs typeface="Courier New" panose="02070309020205020404" pitchFamily="49" charset="0"/>
               </a:rPr>
-              <a:t>eg</a:t>
-            </a:r>
+              <a:t>e,a</a:t>
+            </a:r>
+            <a:r>
+              <a:rPr lang="fr-FR" dirty="0" smtClean="0">
+                <a:latin typeface="Courier New" panose="02070309020205020404" pitchFamily="49" charset="0"/>
+                <a:cs typeface="Courier New" panose="02070309020205020404" pitchFamily="49" charset="0"/>
+              </a:rPr>
+              <a:t>'</a:t>
+            </a:r>
+          </a:p>
+          <a:p>
             <a:r>
               <a:rPr lang="fr-FR" dirty="0">
                 <a:latin typeface="Courier New" panose="02070309020205020404" pitchFamily="49" charset="0"/>
@@ -7113,101 +7108,11 @@
               <a:t> </a:t>
             </a:r>
             <a:r>
-              <a:rPr lang="fr-FR" dirty="0" err="1">
+              <a:rPr lang="fr-FR" dirty="0" smtClean="0">
                 <a:latin typeface="Courier New" panose="02070309020205020404" pitchFamily="49" charset="0"/>
                 <a:cs typeface="Courier New" panose="02070309020205020404" pitchFamily="49" charset="0"/>
               </a:rPr>
-              <a:t>ao</a:t>
-            </a:r>
-            <a:r>
-              <a:rPr lang="fr-FR" dirty="0">
-                <a:latin typeface="Courier New" panose="02070309020205020404" pitchFamily="49" charset="0"/>
-                <a:cs typeface="Courier New" panose="02070309020205020404" pitchFamily="49" charset="0"/>
-              </a:rPr>
-              <a:t>'</a:t>
-            </a:r>
-          </a:p>
-          <a:p>
-            <a:r>
-              <a:rPr lang="fr-FR" dirty="0">
-                <a:latin typeface="Courier New" panose="02070309020205020404" pitchFamily="49" charset="0"/>
-                <a:cs typeface="Courier New" panose="02070309020205020404" pitchFamily="49" charset="0"/>
-              </a:rPr>
-              <a:t> </a:t>
-            </a:r>
-            <a:r>
-              <a:rPr lang="fr-FR" dirty="0" smtClean="0">
-                <a:latin typeface="Courier New" panose="02070309020205020404" pitchFamily="49" charset="0"/>
-                <a:cs typeface="Courier New" panose="02070309020205020404" pitchFamily="49" charset="0"/>
-              </a:rPr>
-              <a:t>  </a:t>
-            </a:r>
-            <a:r>
-              <a:rPr lang="fr-FR" dirty="0" smtClean="0">
-                <a:latin typeface="Courier New" panose="02070309020205020404" pitchFamily="49" charset="0"/>
-                <a:cs typeface="Courier New" panose="02070309020205020404" pitchFamily="49" charset="0"/>
-              </a:rPr>
-              <a:t> </a:t>
-            </a:r>
-            <a:r>
-              <a:rPr lang="fr-FR" dirty="0" smtClean="0">
-                <a:latin typeface="Courier New" panose="02070309020205020404" pitchFamily="49" charset="0"/>
-                <a:cs typeface="Courier New" panose="02070309020205020404" pitchFamily="49" charset="0"/>
-              </a:rPr>
-              <a:t>s[:8:3]</a:t>
-            </a:r>
-          </a:p>
-          <a:p>
-            <a:r>
-              <a:rPr lang="fr-FR" dirty="0" smtClean="0">
-                <a:latin typeface="Courier New" panose="02070309020205020404" pitchFamily="49" charset="0"/>
-                <a:cs typeface="Courier New" panose="02070309020205020404" pitchFamily="49" charset="0"/>
-              </a:rPr>
-              <a:t>'</a:t>
-            </a:r>
-            <a:r>
-              <a:rPr lang="fr-FR" dirty="0" err="1" smtClean="0">
-                <a:latin typeface="Courier New" panose="02070309020205020404" pitchFamily="49" charset="0"/>
-                <a:cs typeface="Courier New" panose="02070309020205020404" pitchFamily="49" charset="0"/>
-              </a:rPr>
-              <a:t>e,a</a:t>
-            </a:r>
-            <a:r>
-              <a:rPr lang="fr-FR" dirty="0" smtClean="0">
-                <a:latin typeface="Courier New" panose="02070309020205020404" pitchFamily="49" charset="0"/>
-                <a:cs typeface="Courier New" panose="02070309020205020404" pitchFamily="49" charset="0"/>
-              </a:rPr>
-              <a:t>'</a:t>
-            </a:r>
-          </a:p>
-          <a:p>
-            <a:r>
-              <a:rPr lang="fr-FR" dirty="0">
-                <a:latin typeface="Courier New" panose="02070309020205020404" pitchFamily="49" charset="0"/>
-                <a:cs typeface="Courier New" panose="02070309020205020404" pitchFamily="49" charset="0"/>
-              </a:rPr>
-              <a:t> </a:t>
-            </a:r>
-            <a:r>
-              <a:rPr lang="fr-FR" dirty="0" smtClean="0">
-                <a:latin typeface="Courier New" panose="02070309020205020404" pitchFamily="49" charset="0"/>
-                <a:cs typeface="Courier New" panose="02070309020205020404" pitchFamily="49" charset="0"/>
-              </a:rPr>
-              <a:t>  </a:t>
-            </a:r>
-            <a:r>
-              <a:rPr lang="fr-FR" dirty="0" smtClean="0">
-                <a:latin typeface="Courier New" panose="02070309020205020404" pitchFamily="49" charset="0"/>
-                <a:cs typeface="Courier New" panose="02070309020205020404" pitchFamily="49" charset="0"/>
-              </a:rPr>
-              <a:t> </a:t>
-            </a:r>
-            <a:r>
-              <a:rPr lang="fr-FR" dirty="0" smtClean="0">
-                <a:latin typeface="Courier New" panose="02070309020205020404" pitchFamily="49" charset="0"/>
-                <a:cs typeface="Courier New" panose="02070309020205020404" pitchFamily="49" charset="0"/>
-              </a:rPr>
-              <a:t>s[2::3]</a:t>
+              <a:t>   s[2::3]</a:t>
             </a:r>
           </a:p>
           <a:p>
@@ -7470,27 +7375,7 @@
                   <a:latin typeface="Courier New" panose="02070309020205020404" pitchFamily="49" charset="0"/>
                   <a:cs typeface="Courier New" panose="02070309020205020404" pitchFamily="49" charset="0"/>
                 </a:rPr>
-                <a:t> 0   1   2   3   4   5   6   7   8   </a:t>
-              </a:r>
-              <a:r>
-                <a:rPr lang="fr-FR" dirty="0" smtClean="0">
-                  <a:solidFill>
-                    <a:srgbClr val="FF0000"/>
-                  </a:solidFill>
-                  <a:latin typeface="Courier New" panose="02070309020205020404" pitchFamily="49" charset="0"/>
-                  <a:cs typeface="Courier New" panose="02070309020205020404" pitchFamily="49" charset="0"/>
-                </a:rPr>
-                <a:t>9        </a:t>
-              </a:r>
-              <a:r>
-                <a:rPr lang="fr-FR" dirty="0" smtClean="0">
-                  <a:solidFill>
-                    <a:srgbClr val="FF0000"/>
-                  </a:solidFill>
-                  <a:latin typeface="Courier New" panose="02070309020205020404" pitchFamily="49" charset="0"/>
-                  <a:cs typeface="Courier New" panose="02070309020205020404" pitchFamily="49" charset="0"/>
-                </a:rPr>
-                <a:t>   </a:t>
+                <a:t> 0   1   2   3   4   5   6   7   8   9           </a:t>
               </a:r>
               <a:endParaRPr lang="fr-FR" dirty="0">
                 <a:solidFill>
@@ -8680,14 +8565,7 @@
                 <a:latin typeface="Courier New" panose="02070309020205020404" pitchFamily="49" charset="0"/>
                 <a:cs typeface="Courier New" panose="02070309020205020404" pitchFamily="49" charset="0"/>
               </a:rPr>
-              <a:t>  </a:t>
-            </a:r>
-            <a:r>
-              <a:rPr lang="fr-FR" dirty="0" smtClean="0">
-                <a:latin typeface="Courier New" panose="02070309020205020404" pitchFamily="49" charset="0"/>
-                <a:cs typeface="Courier New" panose="02070309020205020404" pitchFamily="49" charset="0"/>
-              </a:rPr>
-              <a:t> s[100]</a:t>
+              <a:t>   s[100]</a:t>
             </a:r>
           </a:p>
           <a:p>
@@ -8766,14 +8644,7 @@
                 <a:latin typeface="Courier New" panose="02070309020205020404" pitchFamily="49" charset="0"/>
                 <a:cs typeface="Courier New" panose="02070309020205020404" pitchFamily="49" charset="0"/>
               </a:rPr>
-              <a:t>  </a:t>
-            </a:r>
-            <a:r>
-              <a:rPr lang="fr-FR" dirty="0" smtClean="0">
-                <a:latin typeface="Courier New" panose="02070309020205020404" pitchFamily="49" charset="0"/>
-                <a:cs typeface="Courier New" panose="02070309020205020404" pitchFamily="49" charset="0"/>
-              </a:rPr>
-              <a:t> s[5:100]</a:t>
+              <a:t>   s[5:100]</a:t>
             </a:r>
           </a:p>
           <a:p>
@@ -8798,14 +8669,7 @@
                 <a:latin typeface="Courier New" panose="02070309020205020404" pitchFamily="49" charset="0"/>
                 <a:cs typeface="Courier New" panose="02070309020205020404" pitchFamily="49" charset="0"/>
               </a:rPr>
-              <a:t>  </a:t>
-            </a:r>
-            <a:r>
-              <a:rPr lang="fr-FR" dirty="0" smtClean="0">
-                <a:latin typeface="Courier New" panose="02070309020205020404" pitchFamily="49" charset="0"/>
-                <a:cs typeface="Courier New" panose="02070309020205020404" pitchFamily="49" charset="0"/>
-              </a:rPr>
-              <a:t> s[100:200]</a:t>
+              <a:t>   s[100:200]</a:t>
             </a:r>
           </a:p>
           <a:p>
@@ -8926,27 +8790,7 @@
                   <a:latin typeface="Courier New" panose="02070309020205020404" pitchFamily="49" charset="0"/>
                   <a:cs typeface="Courier New" panose="02070309020205020404" pitchFamily="49" charset="0"/>
                 </a:rPr>
-                <a:t> 0   1   2   3   4   5   6   7   8   </a:t>
-              </a:r>
-              <a:r>
-                <a:rPr lang="fr-FR" dirty="0" smtClean="0">
-                  <a:solidFill>
-                    <a:srgbClr val="FF0000"/>
-                  </a:solidFill>
-                  <a:latin typeface="Courier New" panose="02070309020205020404" pitchFamily="49" charset="0"/>
-                  <a:cs typeface="Courier New" panose="02070309020205020404" pitchFamily="49" charset="0"/>
-                </a:rPr>
-                <a:t>9        </a:t>
-              </a:r>
-              <a:r>
-                <a:rPr lang="fr-FR" dirty="0" smtClean="0">
-                  <a:solidFill>
-                    <a:srgbClr val="FF0000"/>
-                  </a:solidFill>
-                  <a:latin typeface="Courier New" panose="02070309020205020404" pitchFamily="49" charset="0"/>
-                  <a:cs typeface="Courier New" panose="02070309020205020404" pitchFamily="49" charset="0"/>
-                </a:rPr>
-                <a:t>   </a:t>
+                <a:t> 0   1   2   3   4   5   6   7   8   9           </a:t>
               </a:r>
               <a:endParaRPr lang="fr-FR" dirty="0">
                 <a:solidFill>
@@ -9661,14 +9505,7 @@
                 <a:latin typeface="Courier New" panose="02070309020205020404" pitchFamily="49" charset="0"/>
                 <a:cs typeface="Courier New" panose="02070309020205020404" pitchFamily="49" charset="0"/>
               </a:rPr>
-              <a:t>  </a:t>
-            </a:r>
-            <a:r>
-              <a:rPr lang="fr-FR" dirty="0" smtClean="0">
-                <a:latin typeface="Courier New" panose="02070309020205020404" pitchFamily="49" charset="0"/>
-                <a:cs typeface="Courier New" panose="02070309020205020404" pitchFamily="49" charset="0"/>
-              </a:rPr>
-              <a:t> s[-10:-7]</a:t>
+              <a:t>   s[-10:-7]</a:t>
             </a:r>
           </a:p>
           <a:p>
@@ -9707,14 +9544,97 @@
                 <a:latin typeface="Courier New" panose="02070309020205020404" pitchFamily="49" charset="0"/>
                 <a:cs typeface="Courier New" panose="02070309020205020404" pitchFamily="49" charset="0"/>
               </a:rPr>
-              <a:t>  </a:t>
+              <a:t>   s[:-3]</a:t>
+            </a:r>
+          </a:p>
+          <a:p>
+            <a:r>
+              <a:rPr lang="fr-FR" dirty="0">
+                <a:latin typeface="Courier New" panose="02070309020205020404" pitchFamily="49" charset="0"/>
+                <a:cs typeface="Courier New" panose="02070309020205020404" pitchFamily="49" charset="0"/>
+              </a:rPr>
+              <a:t>'</a:t>
+            </a:r>
+            <a:r>
+              <a:rPr lang="fr-FR" dirty="0" err="1">
+                <a:latin typeface="Courier New" panose="02070309020205020404" pitchFamily="49" charset="0"/>
+                <a:cs typeface="Courier New" panose="02070309020205020404" pitchFamily="49" charset="0"/>
+              </a:rPr>
+              <a:t>egg</a:t>
+            </a:r>
+            <a:r>
+              <a:rPr lang="fr-FR" dirty="0">
+                <a:latin typeface="Courier New" panose="02070309020205020404" pitchFamily="49" charset="0"/>
+                <a:cs typeface="Courier New" panose="02070309020205020404" pitchFamily="49" charset="0"/>
+              </a:rPr>
+              <a:t>, </a:t>
+            </a:r>
+            <a:r>
+              <a:rPr lang="fr-FR" dirty="0" err="1" smtClean="0">
+                <a:latin typeface="Courier New" panose="02070309020205020404" pitchFamily="49" charset="0"/>
+                <a:cs typeface="Courier New" panose="02070309020205020404" pitchFamily="49" charset="0"/>
+              </a:rPr>
+              <a:t>ba</a:t>
             </a:r>
             <a:r>
               <a:rPr lang="fr-FR" dirty="0" smtClean="0">
                 <a:latin typeface="Courier New" panose="02070309020205020404" pitchFamily="49" charset="0"/>
                 <a:cs typeface="Courier New" panose="02070309020205020404" pitchFamily="49" charset="0"/>
               </a:rPr>
-              <a:t> s[:-3]</a:t>
+              <a:t>'</a:t>
+            </a:r>
+          </a:p>
+          <a:p>
+            <a:r>
+              <a:rPr lang="fr-FR" dirty="0">
+                <a:latin typeface="Courier New" panose="02070309020205020404" pitchFamily="49" charset="0"/>
+                <a:cs typeface="Courier New" panose="02070309020205020404" pitchFamily="49" charset="0"/>
+              </a:rPr>
+              <a:t> </a:t>
+            </a:r>
+            <a:r>
+              <a:rPr lang="fr-FR" dirty="0" smtClean="0">
+                <a:latin typeface="Courier New" panose="02070309020205020404" pitchFamily="49" charset="0"/>
+                <a:cs typeface="Courier New" panose="02070309020205020404" pitchFamily="49" charset="0"/>
+              </a:rPr>
+              <a:t>   s[::-1]</a:t>
+            </a:r>
+          </a:p>
+          <a:p>
+            <a:r>
+              <a:rPr lang="fr-FR" dirty="0">
+                <a:latin typeface="Courier New" panose="02070309020205020404" pitchFamily="49" charset="0"/>
+                <a:cs typeface="Courier New" panose="02070309020205020404" pitchFamily="49" charset="0"/>
+              </a:rPr>
+              <a:t>'</a:t>
+            </a:r>
+            <a:r>
+              <a:rPr lang="fr-FR" dirty="0" err="1">
+                <a:latin typeface="Courier New" panose="02070309020205020404" pitchFamily="49" charset="0"/>
+                <a:cs typeface="Courier New" panose="02070309020205020404" pitchFamily="49" charset="0"/>
+              </a:rPr>
+              <a:t>nocab</a:t>
+            </a:r>
+            <a:r>
+              <a:rPr lang="fr-FR" dirty="0">
+                <a:latin typeface="Courier New" panose="02070309020205020404" pitchFamily="49" charset="0"/>
+                <a:cs typeface="Courier New" panose="02070309020205020404" pitchFamily="49" charset="0"/>
+              </a:rPr>
+              <a:t> ,</a:t>
+            </a:r>
+            <a:r>
+              <a:rPr lang="fr-FR" dirty="0" err="1" smtClean="0">
+                <a:latin typeface="Courier New" panose="02070309020205020404" pitchFamily="49" charset="0"/>
+                <a:cs typeface="Courier New" panose="02070309020205020404" pitchFamily="49" charset="0"/>
+              </a:rPr>
+              <a:t>gge</a:t>
+            </a:r>
+            <a:r>
+              <a:rPr lang="fr-FR" dirty="0">
+                <a:latin typeface="Courier New" panose="02070309020205020404" pitchFamily="49" charset="0"/>
+                <a:cs typeface="Courier New" panose="02070309020205020404" pitchFamily="49" charset="0"/>
+              </a:rPr>
+              <a:t>'</a:t>
             </a:r>
             <a:endParaRPr lang="fr-FR" dirty="0" smtClean="0">
               <a:latin typeface="Courier New" panose="02070309020205020404" pitchFamily="49" charset="0"/>
@@ -9727,115 +9647,14 @@
                 <a:latin typeface="Courier New" panose="02070309020205020404" pitchFamily="49" charset="0"/>
                 <a:cs typeface="Courier New" panose="02070309020205020404" pitchFamily="49" charset="0"/>
               </a:rPr>
-              <a:t>'</a:t>
-            </a:r>
-            <a:r>
-              <a:rPr lang="fr-FR" dirty="0" err="1">
+              <a:t> </a:t>
+            </a:r>
+            <a:r>
+              <a:rPr lang="fr-FR" dirty="0" smtClean="0">
                 <a:latin typeface="Courier New" panose="02070309020205020404" pitchFamily="49" charset="0"/>
                 <a:cs typeface="Courier New" panose="02070309020205020404" pitchFamily="49" charset="0"/>
               </a:rPr>
-              <a:t>egg</a:t>
-            </a:r>
-            <a:r>
-              <a:rPr lang="fr-FR" dirty="0">
-                <a:latin typeface="Courier New" panose="02070309020205020404" pitchFamily="49" charset="0"/>
-                <a:cs typeface="Courier New" panose="02070309020205020404" pitchFamily="49" charset="0"/>
-              </a:rPr>
-              <a:t>, </a:t>
-            </a:r>
-            <a:r>
-              <a:rPr lang="fr-FR" dirty="0" err="1" smtClean="0">
-                <a:latin typeface="Courier New" panose="02070309020205020404" pitchFamily="49" charset="0"/>
-                <a:cs typeface="Courier New" panose="02070309020205020404" pitchFamily="49" charset="0"/>
-              </a:rPr>
-              <a:t>ba</a:t>
-            </a:r>
-            <a:r>
-              <a:rPr lang="fr-FR" dirty="0" smtClean="0">
-                <a:latin typeface="Courier New" panose="02070309020205020404" pitchFamily="49" charset="0"/>
-                <a:cs typeface="Courier New" panose="02070309020205020404" pitchFamily="49" charset="0"/>
-              </a:rPr>
-              <a:t>'</a:t>
-            </a:r>
-          </a:p>
-          <a:p>
-            <a:r>
-              <a:rPr lang="fr-FR" dirty="0">
-                <a:latin typeface="Courier New" panose="02070309020205020404" pitchFamily="49" charset="0"/>
-                <a:cs typeface="Courier New" panose="02070309020205020404" pitchFamily="49" charset="0"/>
-              </a:rPr>
-              <a:t> </a:t>
-            </a:r>
-            <a:r>
-              <a:rPr lang="fr-FR" dirty="0" smtClean="0">
-                <a:latin typeface="Courier New" panose="02070309020205020404" pitchFamily="49" charset="0"/>
-                <a:cs typeface="Courier New" panose="02070309020205020404" pitchFamily="49" charset="0"/>
-              </a:rPr>
-              <a:t>   s[::-1]</a:t>
-            </a:r>
-          </a:p>
-          <a:p>
-            <a:r>
-              <a:rPr lang="fr-FR" dirty="0">
-                <a:latin typeface="Courier New" panose="02070309020205020404" pitchFamily="49" charset="0"/>
-                <a:cs typeface="Courier New" panose="02070309020205020404" pitchFamily="49" charset="0"/>
-              </a:rPr>
-              <a:t>'</a:t>
-            </a:r>
-            <a:r>
-              <a:rPr lang="fr-FR" dirty="0" err="1">
-                <a:latin typeface="Courier New" panose="02070309020205020404" pitchFamily="49" charset="0"/>
-                <a:cs typeface="Courier New" panose="02070309020205020404" pitchFamily="49" charset="0"/>
-              </a:rPr>
-              <a:t>nocab</a:t>
-            </a:r>
-            <a:r>
-              <a:rPr lang="fr-FR" dirty="0">
-                <a:latin typeface="Courier New" panose="02070309020205020404" pitchFamily="49" charset="0"/>
-                <a:cs typeface="Courier New" panose="02070309020205020404" pitchFamily="49" charset="0"/>
-              </a:rPr>
-              <a:t> ,</a:t>
-            </a:r>
-            <a:r>
-              <a:rPr lang="fr-FR" dirty="0" err="1" smtClean="0">
-                <a:latin typeface="Courier New" panose="02070309020205020404" pitchFamily="49" charset="0"/>
-                <a:cs typeface="Courier New" panose="02070309020205020404" pitchFamily="49" charset="0"/>
-              </a:rPr>
-              <a:t>gge</a:t>
-            </a:r>
-            <a:r>
-              <a:rPr lang="fr-FR" dirty="0">
-                <a:latin typeface="Courier New" panose="02070309020205020404" pitchFamily="49" charset="0"/>
-                <a:cs typeface="Courier New" panose="02070309020205020404" pitchFamily="49" charset="0"/>
-              </a:rPr>
-              <a:t>'</a:t>
-            </a:r>
-            <a:endParaRPr lang="fr-FR" dirty="0" smtClean="0">
-              <a:latin typeface="Courier New" panose="02070309020205020404" pitchFamily="49" charset="0"/>
-              <a:cs typeface="Courier New" panose="02070309020205020404" pitchFamily="49" charset="0"/>
-            </a:endParaRPr>
-          </a:p>
-          <a:p>
-            <a:r>
-              <a:rPr lang="fr-FR" dirty="0">
-                <a:latin typeface="Courier New" panose="02070309020205020404" pitchFamily="49" charset="0"/>
-                <a:cs typeface="Courier New" panose="02070309020205020404" pitchFamily="49" charset="0"/>
-              </a:rPr>
-              <a:t> </a:t>
-            </a:r>
-            <a:r>
-              <a:rPr lang="fr-FR" dirty="0" smtClean="0">
-                <a:latin typeface="Courier New" panose="02070309020205020404" pitchFamily="49" charset="0"/>
-                <a:cs typeface="Courier New" panose="02070309020205020404" pitchFamily="49" charset="0"/>
-              </a:rPr>
-              <a:t>  </a:t>
-            </a:r>
-            <a:r>
-              <a:rPr lang="fr-FR" dirty="0" smtClean="0">
-                <a:latin typeface="Courier New" panose="02070309020205020404" pitchFamily="49" charset="0"/>
-                <a:cs typeface="Courier New" panose="02070309020205020404" pitchFamily="49" charset="0"/>
-              </a:rPr>
-              <a:t> s[2:0:-1]</a:t>
+              <a:t>   s[2:0:-1]</a:t>
             </a:r>
           </a:p>
           <a:p>
@@ -10050,27 +9869,7 @@
                   <a:latin typeface="Courier New" panose="02070309020205020404" pitchFamily="49" charset="0"/>
                   <a:cs typeface="Courier New" panose="02070309020205020404" pitchFamily="49" charset="0"/>
                 </a:rPr>
-                <a:t> 0   1   2   3   4   5   6   7   8   </a:t>
-              </a:r>
-              <a:r>
-                <a:rPr lang="fr-FR" dirty="0" smtClean="0">
-                  <a:solidFill>
-                    <a:srgbClr val="FF0000"/>
-                  </a:solidFill>
-                  <a:latin typeface="Courier New" panose="02070309020205020404" pitchFamily="49" charset="0"/>
-                  <a:cs typeface="Courier New" panose="02070309020205020404" pitchFamily="49" charset="0"/>
-                </a:rPr>
-                <a:t>9        </a:t>
-              </a:r>
-              <a:r>
-                <a:rPr lang="fr-FR" dirty="0" smtClean="0">
-                  <a:solidFill>
-                    <a:srgbClr val="FF0000"/>
-                  </a:solidFill>
-                  <a:latin typeface="Courier New" panose="02070309020205020404" pitchFamily="49" charset="0"/>
-                  <a:cs typeface="Courier New" panose="02070309020205020404" pitchFamily="49" charset="0"/>
-                </a:rPr>
-                <a:t>   </a:t>
+                <a:t> 0   1   2   3   4   5   6   7   8   9           </a:t>
               </a:r>
               <a:endParaRPr lang="fr-FR" dirty="0">
                 <a:solidFill>
@@ -10113,107 +9912,7 @@
                 <a:latin typeface="Courier New" panose="02070309020205020404" pitchFamily="49" charset="0"/>
                 <a:cs typeface="Courier New" panose="02070309020205020404" pitchFamily="49" charset="0"/>
               </a:rPr>
-              <a:t>-</a:t>
-            </a:r>
-            <a:r>
-              <a:rPr lang="fr-FR" dirty="0" smtClean="0">
-                <a:solidFill>
-                  <a:srgbClr val="00B050"/>
-                </a:solidFill>
-                <a:latin typeface="Courier New" panose="02070309020205020404" pitchFamily="49" charset="0"/>
-                <a:cs typeface="Courier New" panose="02070309020205020404" pitchFamily="49" charset="0"/>
-              </a:rPr>
-              <a:t>10 </a:t>
-            </a:r>
-            <a:r>
-              <a:rPr lang="fr-FR" dirty="0" smtClean="0">
-                <a:solidFill>
-                  <a:srgbClr val="00B050"/>
-                </a:solidFill>
-                <a:latin typeface="Courier New" panose="02070309020205020404" pitchFamily="49" charset="0"/>
-                <a:cs typeface="Courier New" panose="02070309020205020404" pitchFamily="49" charset="0"/>
-              </a:rPr>
-              <a:t> -</a:t>
-            </a:r>
-            <a:r>
-              <a:rPr lang="fr-FR" dirty="0" smtClean="0">
-                <a:solidFill>
-                  <a:srgbClr val="00B050"/>
-                </a:solidFill>
-                <a:latin typeface="Courier New" panose="02070309020205020404" pitchFamily="49" charset="0"/>
-                <a:cs typeface="Courier New" panose="02070309020205020404" pitchFamily="49" charset="0"/>
-              </a:rPr>
-              <a:t>9</a:t>
-            </a:r>
-            <a:r>
-              <a:rPr lang="fr-FR" dirty="0" smtClean="0">
-                <a:solidFill>
-                  <a:srgbClr val="00B050"/>
-                </a:solidFill>
-                <a:latin typeface="Courier New" panose="02070309020205020404" pitchFamily="49" charset="0"/>
-                <a:cs typeface="Courier New" panose="02070309020205020404" pitchFamily="49" charset="0"/>
-              </a:rPr>
-              <a:t>  -</a:t>
-            </a:r>
-            <a:r>
-              <a:rPr lang="fr-FR" dirty="0" smtClean="0">
-                <a:solidFill>
-                  <a:srgbClr val="00B050"/>
-                </a:solidFill>
-                <a:latin typeface="Courier New" panose="02070309020205020404" pitchFamily="49" charset="0"/>
-                <a:cs typeface="Courier New" panose="02070309020205020404" pitchFamily="49" charset="0"/>
-              </a:rPr>
-              <a:t>8</a:t>
-            </a:r>
-            <a:r>
-              <a:rPr lang="fr-FR" dirty="0" smtClean="0">
-                <a:solidFill>
-                  <a:srgbClr val="00B050"/>
-                </a:solidFill>
-                <a:latin typeface="Courier New" panose="02070309020205020404" pitchFamily="49" charset="0"/>
-                <a:cs typeface="Courier New" panose="02070309020205020404" pitchFamily="49" charset="0"/>
-              </a:rPr>
-              <a:t>  -</a:t>
-            </a:r>
-            <a:r>
-              <a:rPr lang="fr-FR" dirty="0" smtClean="0">
-                <a:solidFill>
-                  <a:srgbClr val="00B050"/>
-                </a:solidFill>
-                <a:latin typeface="Courier New" panose="02070309020205020404" pitchFamily="49" charset="0"/>
-                <a:cs typeface="Courier New" panose="02070309020205020404" pitchFamily="49" charset="0"/>
-              </a:rPr>
-              <a:t>7</a:t>
-            </a:r>
-            <a:r>
-              <a:rPr lang="fr-FR" dirty="0" smtClean="0">
-                <a:solidFill>
-                  <a:srgbClr val="00B050"/>
-                </a:solidFill>
-                <a:latin typeface="Courier New" panose="02070309020205020404" pitchFamily="49" charset="0"/>
-                <a:cs typeface="Courier New" panose="02070309020205020404" pitchFamily="49" charset="0"/>
-              </a:rPr>
-              <a:t>  -6  -5  -4  -3  -2  </a:t>
-            </a:r>
-            <a:r>
-              <a:rPr lang="fr-FR" dirty="0" smtClean="0">
-                <a:solidFill>
-                  <a:srgbClr val="00B050"/>
-                </a:solidFill>
-                <a:latin typeface="Courier New" panose="02070309020205020404" pitchFamily="49" charset="0"/>
-                <a:cs typeface="Courier New" panose="02070309020205020404" pitchFamily="49" charset="0"/>
-              </a:rPr>
-              <a:t>-1</a:t>
-            </a:r>
-            <a:r>
-              <a:rPr lang="fr-FR" dirty="0" smtClean="0">
-                <a:solidFill>
-                  <a:srgbClr val="00B050"/>
-                </a:solidFill>
-                <a:latin typeface="Courier New" panose="02070309020205020404" pitchFamily="49" charset="0"/>
-                <a:cs typeface="Courier New" panose="02070309020205020404" pitchFamily="49" charset="0"/>
-              </a:rPr>
-              <a:t>           </a:t>
+              <a:t>-10  -9  -8  -7  -6  -5  -4  -3  -2  -1           </a:t>
             </a:r>
             <a:endParaRPr lang="fr-FR" dirty="0">
               <a:solidFill>

</xml_diff>

<commit_message>
-add the material for the tuples. -update the list material to split list and tuples in two videos
</commit_message>
<xml_diff>
--- a/semaine2/CO12AL-W2-SLIDE3.pptx
+++ b/semaine2/CO12AL-W2-SLIDE3.pptx
@@ -951,6 +951,26 @@
           <a:bodyPr/>
           <a:lstStyle/>
           <a:p>
+            <a:r>
+              <a:rPr lang="fr-FR" dirty="0" smtClean="0"/>
+              <a:t>Premier</a:t>
+            </a:r>
+            <a:r>
+              <a:rPr lang="fr-FR" baseline="0" dirty="0" smtClean="0"/>
+              <a:t> argument (en vert) au deuxième argument (</a:t>
+            </a:r>
+            <a:r>
+              <a:rPr lang="fr-FR" baseline="0" smtClean="0"/>
+              <a:t>en bleu) exclus </a:t>
+            </a:r>
+            <a:r>
+              <a:rPr lang="fr-FR" baseline="0" dirty="0" smtClean="0"/>
+              <a:t>(c’est-à-dire le </a:t>
+            </a:r>
+            <a:r>
+              <a:rPr lang="fr-FR" baseline="0" smtClean="0"/>
+              <a:t>deuxième argument -1)</a:t>
+            </a:r>
             <a:endParaRPr lang="fr-FR" dirty="0"/>
           </a:p>
         </p:txBody>

</xml_diff>